<commit_message>
modified:   Exodus/exo3_11-22.pdf modified:   Exodus/exo3_11-22.pptx
</commit_message>
<xml_diff>
--- a/ppt/Exodus/exo3_11-22.pptx
+++ b/ppt/Exodus/exo3_11-22.pptx
@@ -5,7 +5,7 @@
     <p:sldMasterId id="2147483648" r:id="rId1"/>
   </p:sldMasterIdLst>
   <p:notesMasterIdLst>
-    <p:notesMasterId r:id="rId12"/>
+    <p:notesMasterId r:id="rId13"/>
   </p:notesMasterIdLst>
   <p:sldIdLst>
     <p:sldId id="1414" r:id="rId2"/>
@@ -15,9 +15,10 @@
     <p:sldId id="1461" r:id="rId6"/>
     <p:sldId id="1463" r:id="rId7"/>
     <p:sldId id="1464" r:id="rId8"/>
-    <p:sldId id="1443" r:id="rId9"/>
-    <p:sldId id="1459" r:id="rId10"/>
-    <p:sldId id="1453" r:id="rId11"/>
+    <p:sldId id="1465" r:id="rId9"/>
+    <p:sldId id="1443" r:id="rId10"/>
+    <p:sldId id="1459" r:id="rId11"/>
+    <p:sldId id="1453" r:id="rId12"/>
   </p:sldIdLst>
   <p:sldSz cx="12192000" cy="6858000"/>
   <p:notesSz cx="6858000" cy="9144000"/>
@@ -4230,6 +4231,123 @@
           <a:chExt cx="0" cy="0"/>
         </a:xfrm>
       </p:grpSpPr>
+      <p:graphicFrame>
+        <p:nvGraphicFramePr>
+          <p:cNvPr id="4" name="Content Placeholder 3"/>
+          <p:cNvGraphicFramePr>
+            <a:graphicFrameLocks noGrp="1"/>
+          </p:cNvGraphicFramePr>
+          <p:nvPr>
+            <p:ph idx="1"/>
+            <p:custDataLst>
+              <p:tags r:id="rId1"/>
+            </p:custDataLst>
+          </p:nvPr>
+        </p:nvGraphicFramePr>
+        <p:xfrm>
+          <a:off x="480695" y="478203"/>
+          <a:ext cx="11230610" cy="6045689"/>
+        </p:xfrm>
+        <a:graphic>
+          <a:graphicData uri="http://schemas.openxmlformats.org/drawingml/2006/table">
+            <a:tbl>
+              <a:tblPr firstRow="1" bandRow="1">
+                <a:tableStyleId>{5C22544A-7EE6-4342-B048-85BDC9FD1C3A}</a:tableStyleId>
+              </a:tblPr>
+              <a:tblGrid>
+                <a:gridCol w="11230610">
+                  <a:extLst>
+                    <a:ext uri="{9D8B030D-6E8A-4147-A177-3AD203B41FA5}">
+                      <a16:colId xmlns:a16="http://schemas.microsoft.com/office/drawing/2014/main" val="20000"/>
+                    </a:ext>
+                  </a:extLst>
+                </a:gridCol>
+              </a:tblGrid>
+              <a:tr h="656609">
+                <a:tc>
+                  <a:txBody>
+                    <a:bodyPr/>
+                    <a:lstStyle/>
+                    <a:p>
+                      <a:pPr algn="ctr">
+                        <a:buNone/>
+                      </a:pPr>
+                      <a:r>
+                        <a:rPr lang="en-US" altLang="zh-CN" sz="3200" dirty="0"/>
+                        <a:t>Closing Prayer</a:t>
+                      </a:r>
+                    </a:p>
+                  </a:txBody>
+                  <a:tcPr/>
+                </a:tc>
+                <a:extLst>
+                  <a:ext uri="{0D108BD9-81ED-4DB2-BD59-A6C34878D82A}">
+                    <a16:rowId xmlns:a16="http://schemas.microsoft.com/office/drawing/2014/main" val="10000"/>
+                  </a:ext>
+                </a:extLst>
+              </a:tr>
+              <a:tr h="5389080">
+                <a:tc>
+                  <a:txBody>
+                    <a:bodyPr/>
+                    <a:lstStyle/>
+                    <a:p>
+                      <a:pPr algn="l">
+                        <a:buNone/>
+                      </a:pPr>
+                      <a:r>
+                        <a:rPr lang="en-US" sz="2800" i="1" dirty="0"/>
+                        <a:t>Dear Heavenly Father, </a:t>
+                      </a:r>
+                      <a:r>
+                        <a:rPr lang="en-US" sz="2800" dirty="0"/>
+                        <a:t>the Glorious Lord, the Creator, and Sovereign of all things. Thank you for your mercy and grace. Thank you for calling us, the parents. Thank you for giving us, the parents, the educational authority. Our children are your heritage. We are the sinners; we do not deserve it. May Your Holy Spirit call us, guide us. Bless our children and young generation to be able to know you, follow you to be the devotional generation. May your name be glorified, generation by generation, and forever. I pray in the name of Jesus. Amen.  </a:t>
+                      </a:r>
+                      <a:endParaRPr lang="en-US" sz="2800" i="1" dirty="0"/>
+                    </a:p>
+                  </a:txBody>
+                  <a:tcPr marL="137160" marR="137160" marT="137160" marB="137160"/>
+                </a:tc>
+                <a:extLst>
+                  <a:ext uri="{0D108BD9-81ED-4DB2-BD59-A6C34878D82A}">
+                    <a16:rowId xmlns:a16="http://schemas.microsoft.com/office/drawing/2014/main" val="10001"/>
+                  </a:ext>
+                </a:extLst>
+              </a:tr>
+            </a:tbl>
+          </a:graphicData>
+        </a:graphic>
+      </p:graphicFrame>
+    </p:spTree>
+    <p:extLst>
+      <p:ext uri="{BB962C8B-B14F-4D97-AF65-F5344CB8AC3E}">
+        <p14:creationId xmlns:p14="http://schemas.microsoft.com/office/powerpoint/2010/main" val="3761109616"/>
+      </p:ext>
+    </p:extLst>
+  </p:cSld>
+  <p:clrMapOvr>
+    <a:masterClrMapping/>
+  </p:clrMapOvr>
+</p:sld>
+</file>
+
+<file path=ppt/slides/slide11.xml><?xml version="1.0" encoding="utf-8"?>
+<p:sld xmlns:a="http://schemas.openxmlformats.org/drawingml/2006/main" xmlns:r="http://schemas.openxmlformats.org/officeDocument/2006/relationships" xmlns:p="http://schemas.openxmlformats.org/presentationml/2006/main">
+  <p:cSld>
+    <p:spTree>
+      <p:nvGrpSpPr>
+        <p:cNvPr id="1" name=""/>
+        <p:cNvGrpSpPr/>
+        <p:nvPr/>
+      </p:nvGrpSpPr>
+      <p:grpSpPr>
+        <a:xfrm>
+          <a:off x="0" y="0"/>
+          <a:ext cx="0" cy="0"/>
+          <a:chOff x="0" y="0"/>
+          <a:chExt cx="0" cy="0"/>
+        </a:xfrm>
+      </p:grpSpPr>
       <p:sp>
         <p:nvSpPr>
           <p:cNvPr id="2" name="Title 1"/>
@@ -4318,6 +4436,7 @@
                   <a:srgbClr val="FF0000"/>
                 </a:solidFill>
                 <a:sym typeface="+mn-ea"/>
+                <a:hlinkClick r:id="rId3"/>
               </a:rPr>
               <a:t>https://</a:t>
             </a:r>
@@ -4327,6 +4446,7 @@
                   <a:srgbClr val="FF0000"/>
                 </a:solidFill>
                 <a:sym typeface="+mn-ea"/>
+                <a:hlinkClick r:id="rId3"/>
               </a:rPr>
               <a:t>www.youtube.com</a:t>
             </a:r>
@@ -4336,6 +4456,7 @@
                   <a:srgbClr val="FF0000"/>
                 </a:solidFill>
                 <a:sym typeface="+mn-ea"/>
+                <a:hlinkClick r:id="rId3"/>
               </a:rPr>
               <a:t>/</a:t>
             </a:r>
@@ -4345,6 +4466,7 @@
                   <a:srgbClr val="FF0000"/>
                 </a:solidFill>
                 <a:sym typeface="+mn-ea"/>
+                <a:hlinkClick r:id="rId3"/>
               </a:rPr>
               <a:t>watch?v</a:t>
             </a:r>
@@ -4354,6 +4476,7 @@
                   <a:srgbClr val="FF0000"/>
                 </a:solidFill>
                 <a:sym typeface="+mn-ea"/>
+                <a:hlinkClick r:id="rId3"/>
               </a:rPr>
               <a:t>=yNtid3wdDWA&amp;list=RDyNtid3wdDWA&amp;start_radio=1&amp;ab_channel=</a:t>
             </a:r>
@@ -4363,15 +4486,20 @@
                   <a:srgbClr val="FF0000"/>
                 </a:solidFill>
                 <a:sym typeface="+mn-ea"/>
+                <a:hlinkClick r:id="rId3"/>
               </a:rPr>
               <a:t>GaiseBaba</a:t>
             </a:r>
             <a:r>
               <a:rPr lang="en-US" altLang="en-US" sz="2400" dirty="0">
                 <a:sym typeface="+mn-ea"/>
+                <a:hlinkClick r:id="rId3"/>
               </a:rPr>
               <a:t>         </a:t>
             </a:r>
+            <a:endParaRPr lang="en-US" altLang="en-US" sz="2400" dirty="0">
+              <a:sym typeface="+mn-ea"/>
+            </a:endParaRPr>
           </a:p>
           <a:p>
             <a:pPr marL="635" indent="-635">
@@ -4438,7 +4566,7 @@
                   <a:srgbClr val="00B050"/>
                 </a:solidFill>
                 <a:sym typeface="+mn-ea"/>
-                <a:hlinkClick r:id="rId3"/>
+                <a:hlinkClick r:id="rId4"/>
               </a:rPr>
               <a:t>https://www.youtube.com/watch?v=a-wWKL-7Mrg</a:t>
             </a:r>
@@ -4536,7 +4664,7 @@
             </p:custDataLst>
             <p:extLst>
               <p:ext uri="{D42A27DB-BD31-4B8C-83A1-F6EECF244321}">
-                <p14:modId xmlns:p14="http://schemas.microsoft.com/office/powerpoint/2010/main" val="122069913"/>
+                <p14:modId xmlns:p14="http://schemas.microsoft.com/office/powerpoint/2010/main" val="653802339"/>
               </p:ext>
             </p:extLst>
           </p:nvPr>
@@ -4704,7 +4832,7 @@
                       </a:pPr>
                       <a:r>
                         <a:rPr lang="en-US" altLang="zh-CN" sz="2200" dirty="0"/>
-                        <a:t>God’s Command</a:t>
+                        <a:t>God’s Command </a:t>
                       </a:r>
                       <a:r>
                         <a:rPr lang="ja-JP" altLang="en-US" sz="2200"/>
@@ -4735,11 +4863,11 @@
                       </a:pPr>
                       <a:r>
                         <a:rPr lang="en-US" altLang="zh-CN" sz="2200" dirty="0"/>
-                        <a:t>God’s Promise</a:t>
+                        <a:t>God’s Promise </a:t>
                       </a:r>
                       <a:r>
                         <a:rPr lang="ja-JP" altLang="en-US" sz="2200"/>
-                        <a:t>神的应许与证据</a:t>
+                        <a:t>神的应许</a:t>
                       </a:r>
                       <a:r>
                         <a:rPr lang="en-US" altLang="zh-CN" sz="2200" dirty="0"/>
@@ -4752,7 +4880,7 @@
                       </a:pPr>
                       <a:r>
                         <a:rPr lang="en-US" altLang="zh-CN" sz="2200" dirty="0"/>
-                        <a:t>God’s Sign</a:t>
+                        <a:t>God’s Sign </a:t>
                       </a:r>
                       <a:r>
                         <a:rPr lang="ja-JP" altLang="en-US" sz="2200"/>
@@ -4783,7 +4911,7 @@
                       </a:pPr>
                       <a:r>
                         <a:rPr lang="en-US" altLang="zh-CN" sz="2200" dirty="0"/>
-                        <a:t>God’s Assurance</a:t>
+                        <a:t>God’s Assurance </a:t>
                       </a:r>
                       <a:r>
                         <a:rPr lang="ja-JP" altLang="en-US" sz="2200"/>
@@ -4877,7 +5005,7 @@
                       </a:r>
                       <a:r>
                         <a:rPr lang="en-US" altLang="ja-JP" sz="2200" dirty="0"/>
-                        <a:t>Inferiority</a:t>
+                        <a:t>Inferiority </a:t>
                       </a:r>
                       <a:r>
                         <a:rPr lang="ja-JP" altLang="en-US" sz="2200"/>
@@ -10014,334 +10142,6 @@
           <a:chExt cx="0" cy="0"/>
         </a:xfrm>
       </p:grpSpPr>
-      <p:sp>
-        <p:nvSpPr>
-          <p:cNvPr id="2" name="Title 1"/>
-          <p:cNvSpPr>
-            <a:spLocks noGrp="1"/>
-          </p:cNvSpPr>
-          <p:nvPr>
-            <p:ph type="title"/>
-          </p:nvPr>
-        </p:nvSpPr>
-        <p:spPr>
-          <a:xfrm>
-            <a:off x="609600" y="0"/>
-            <a:ext cx="11081385" cy="686435"/>
-          </a:xfrm>
-        </p:spPr>
-        <p:txBody>
-          <a:bodyPr/>
-          <a:lstStyle/>
-          <a:p>
-            <a:pPr algn="ctr"/>
-            <a:r>
-              <a:rPr lang="zh-CN" altLang="en-US" b="1" dirty="0">
-                <a:solidFill>
-                  <a:srgbClr val="00B050"/>
-                </a:solidFill>
-                <a:latin typeface="DFKai-SB" panose="03000509000000000000" pitchFamily="65" charset="-120"/>
-                <a:ea typeface="DFKai-SB" panose="03000509000000000000" pitchFamily="65" charset="-120"/>
-                <a:sym typeface="+mn-ea"/>
-              </a:rPr>
-              <a:t>個人反思</a:t>
-            </a:r>
-            <a:r>
-              <a:rPr lang="en-US" altLang="zh-CN" b="1" dirty="0">
-                <a:solidFill>
-                  <a:srgbClr val="00B050"/>
-                </a:solidFill>
-                <a:latin typeface="DFKai-SB" panose="03000509000000000000" pitchFamily="65" charset="-120"/>
-                <a:ea typeface="DFKai-SB" panose="03000509000000000000" pitchFamily="65" charset="-120"/>
-                <a:sym typeface="+mn-ea"/>
-              </a:rPr>
-              <a:t> </a:t>
-            </a:r>
-            <a:r>
-              <a:rPr lang="en-US" altLang="zh-CN" b="1" dirty="0">
-                <a:solidFill>
-                  <a:srgbClr val="FF0000"/>
-                </a:solidFill>
-                <a:latin typeface="DFKai-SB" panose="03000509000000000000" pitchFamily="65" charset="-120"/>
-                <a:ea typeface="DFKai-SB" panose="03000509000000000000" pitchFamily="65" charset="-120"/>
-                <a:sym typeface="+mn-ea"/>
-              </a:rPr>
-              <a:t>&amp; </a:t>
-            </a:r>
-            <a:r>
-              <a:rPr lang="zh-CN" altLang="en-US" b="1" dirty="0">
-                <a:solidFill>
-                  <a:srgbClr val="7030A0"/>
-                </a:solidFill>
-                <a:latin typeface="DFKai-SB" panose="03000509000000000000" pitchFamily="65" charset="-120"/>
-                <a:ea typeface="DFKai-SB" panose="03000509000000000000" pitchFamily="65" charset="-120"/>
-              </a:rPr>
-              <a:t>教養智慧</a:t>
-            </a:r>
-            <a:r>
-              <a:rPr lang="en-US" altLang="zh-CN" b="1" dirty="0">
-                <a:solidFill>
-                  <a:srgbClr val="7030A0"/>
-                </a:solidFill>
-                <a:latin typeface="DFKai-SB" panose="03000509000000000000" pitchFamily="65" charset="-120"/>
-                <a:ea typeface="DFKai-SB" panose="03000509000000000000" pitchFamily="65" charset="-120"/>
-              </a:rPr>
-              <a:t> </a:t>
-            </a:r>
-            <a:endParaRPr lang="zh-CN" altLang="en-US" sz="2400" b="1" dirty="0">
-              <a:solidFill>
-                <a:schemeClr val="tx1"/>
-              </a:solidFill>
-              <a:highlight>
-                <a:srgbClr val="FFFF00"/>
-              </a:highlight>
-              <a:latin typeface="DFKai-SB" panose="03000509000000000000" pitchFamily="65" charset="-120"/>
-              <a:ea typeface="DFKai-SB" panose="03000509000000000000" pitchFamily="65" charset="-120"/>
-            </a:endParaRPr>
-          </a:p>
-        </p:txBody>
-      </p:sp>
-      <p:sp>
-        <p:nvSpPr>
-          <p:cNvPr id="3" name="Content Placeholder 2"/>
-          <p:cNvSpPr>
-            <a:spLocks noGrp="1"/>
-          </p:cNvSpPr>
-          <p:nvPr>
-            <p:ph idx="1"/>
-            <p:custDataLst>
-              <p:tags r:id="rId1"/>
-            </p:custDataLst>
-          </p:nvPr>
-        </p:nvSpPr>
-        <p:spPr>
-          <a:xfrm>
-            <a:off x="609600" y="686435"/>
-            <a:ext cx="10972800" cy="5800090"/>
-          </a:xfrm>
-        </p:spPr>
-        <p:txBody>
-          <a:bodyPr/>
-          <a:lstStyle/>
-          <a:p>
-            <a:pPr algn="l">
-              <a:buNone/>
-            </a:pPr>
-            <a:r>
-              <a:rPr lang="en-US" altLang="zh-CN" sz="2600" dirty="0">
-                <a:sym typeface="+mn-ea"/>
-              </a:rPr>
-              <a:t> </a:t>
-            </a:r>
-            <a:r>
-              <a:rPr lang="zh-CN" altLang="en-US" b="1" dirty="0">
-                <a:solidFill>
-                  <a:srgbClr val="00B050"/>
-                </a:solidFill>
-                <a:highlight>
-                  <a:srgbClr val="FFFF00"/>
-                </a:highlight>
-                <a:latin typeface="DFKai-SB" panose="03000509000000000000" pitchFamily="65" charset="-120"/>
-                <a:ea typeface="DFKai-SB" panose="03000509000000000000" pitchFamily="65" charset="-120"/>
-              </a:rPr>
-              <a:t>個人反思</a:t>
-            </a:r>
-            <a:r>
-              <a:rPr lang="zh-CN" altLang="en-US" sz="2800" b="1" dirty="0">
-                <a:solidFill>
-                  <a:srgbClr val="00B050"/>
-                </a:solidFill>
-                <a:latin typeface="DFKai-SB" panose="03000509000000000000" pitchFamily="65" charset="-120"/>
-                <a:ea typeface="DFKai-SB" panose="03000509000000000000" pitchFamily="65" charset="-120"/>
-              </a:rPr>
-              <a:t>：</a:t>
-            </a:r>
-            <a:endParaRPr lang="zh-CN" altLang="en-US" sz="2800" dirty="0">
-              <a:sym typeface="+mn-ea"/>
-            </a:endParaRPr>
-          </a:p>
-          <a:p>
-            <a:pPr marL="357505" indent="-357505" algn="l">
-              <a:buNone/>
-            </a:pPr>
-            <a:r>
-              <a:rPr lang="en-US" altLang="zh-CN" sz="2800" dirty="0">
-                <a:sym typeface="+mn-ea"/>
-              </a:rPr>
-              <a:t>“</a:t>
-            </a:r>
-            <a:r>
-              <a:rPr lang="zh-CN" altLang="en-US" sz="2800" dirty="0">
-                <a:sym typeface="+mn-ea"/>
-              </a:rPr>
-              <a:t>我愿意让孩子相信神，但对我来说无所谓 。</a:t>
-            </a:r>
-            <a:r>
-              <a:rPr lang="en-US" altLang="zh-CN" sz="2800" dirty="0">
-                <a:sym typeface="+mn-ea"/>
-              </a:rPr>
-              <a:t>” </a:t>
-            </a:r>
-            <a:r>
-              <a:rPr lang="ja-JP" altLang="en-US" sz="2800">
-                <a:sym typeface="+mn-ea"/>
-              </a:rPr>
-              <a:t>对吗</a:t>
-            </a:r>
-            <a:r>
-              <a:rPr lang="en-US" altLang="ja-JP" sz="2800" dirty="0">
-                <a:sym typeface="+mn-ea"/>
-              </a:rPr>
-              <a:t>? </a:t>
-            </a:r>
-          </a:p>
-          <a:p>
-            <a:pPr marL="357505" indent="-357505" algn="l">
-              <a:buNone/>
-            </a:pPr>
-            <a:r>
-              <a:rPr lang="en-US" altLang="zh-CN" sz="2800" dirty="0">
-                <a:sym typeface="+mn-ea"/>
-              </a:rPr>
-              <a:t>“I hope my children to believe in God. But it doesn’t matter to me.” Is that right?</a:t>
-            </a:r>
-          </a:p>
-          <a:p>
-            <a:pPr marL="357505" indent="-357505" algn="l">
-              <a:buNone/>
-            </a:pPr>
-            <a:endParaRPr lang="en-US" altLang="zh-CN" sz="2800" b="1" dirty="0">
-              <a:solidFill>
-                <a:srgbClr val="7030A0"/>
-              </a:solidFill>
-              <a:highlight>
-                <a:srgbClr val="FFFF00"/>
-              </a:highlight>
-              <a:latin typeface="DFKai-SB" panose="03000509000000000000" pitchFamily="65" charset="-120"/>
-              <a:ea typeface="DFKai-SB" panose="03000509000000000000" pitchFamily="65" charset="-120"/>
-              <a:sym typeface="+mn-ea"/>
-            </a:endParaRPr>
-          </a:p>
-          <a:p>
-            <a:pPr marL="357505" indent="-357505">
-              <a:buNone/>
-            </a:pPr>
-            <a:r>
-              <a:rPr lang="zh-CN" altLang="en-US" b="1" dirty="0">
-                <a:solidFill>
-                  <a:srgbClr val="7030A0"/>
-                </a:solidFill>
-                <a:highlight>
-                  <a:srgbClr val="FFFF00"/>
-                </a:highlight>
-                <a:latin typeface="DFKai-SB" panose="03000509000000000000" pitchFamily="65" charset="-120"/>
-                <a:ea typeface="DFKai-SB" panose="03000509000000000000" pitchFamily="65" charset="-120"/>
-              </a:rPr>
-              <a:t>教養智慧</a:t>
-            </a:r>
-            <a:r>
-              <a:rPr lang="zh-CN" altLang="en-US" sz="2800" b="1" dirty="0">
-                <a:solidFill>
-                  <a:srgbClr val="00B0F0"/>
-                </a:solidFill>
-                <a:latin typeface="DFKai-SB" panose="03000509000000000000" pitchFamily="65" charset="-120"/>
-                <a:ea typeface="DFKai-SB" panose="03000509000000000000" pitchFamily="65" charset="-120"/>
-              </a:rPr>
-              <a:t>：</a:t>
-            </a:r>
-            <a:endParaRPr lang="en-US" altLang="zh-CN" sz="2800" b="1" dirty="0">
-              <a:solidFill>
-                <a:srgbClr val="00B0F0"/>
-              </a:solidFill>
-              <a:latin typeface="DFKai-SB" panose="03000509000000000000" pitchFamily="65" charset="-120"/>
-              <a:ea typeface="DFKai-SB" panose="03000509000000000000" pitchFamily="65" charset="-120"/>
-            </a:endParaRPr>
-          </a:p>
-          <a:p>
-            <a:pPr marL="357505" indent="-357505">
-              <a:buNone/>
-            </a:pPr>
-            <a:r>
-              <a:rPr lang="en-US" altLang="ja-JP" sz="2800" b="1" dirty="0">
-                <a:solidFill>
-                  <a:srgbClr val="00B0F0"/>
-                </a:solidFill>
-                <a:latin typeface="DFKai-SB" panose="03000509000000000000" pitchFamily="65" charset="-120"/>
-                <a:ea typeface="DFKai-SB" panose="03000509000000000000" pitchFamily="65" charset="-120"/>
-              </a:rPr>
-              <a:t>"</a:t>
-            </a:r>
-            <a:r>
-              <a:rPr lang="ja-JP" altLang="en-US" sz="2800">
-                <a:solidFill>
-                  <a:srgbClr val="00B0F0"/>
-                </a:solidFill>
-                <a:latin typeface="DFKai-SB" panose="03000509000000000000" pitchFamily="65" charset="-120"/>
-                <a:ea typeface="DFKai-SB" panose="03000509000000000000" pitchFamily="65" charset="-120"/>
-              </a:rPr>
-              <a:t>至于我、和我家、我们必定事奉耶和华。</a:t>
-            </a:r>
-            <a:r>
-              <a:rPr lang="en-US" altLang="ja-JP" sz="2800" dirty="0">
-                <a:solidFill>
-                  <a:srgbClr val="00B0F0"/>
-                </a:solidFill>
-                <a:latin typeface="DFKai-SB" panose="03000509000000000000" pitchFamily="65" charset="-120"/>
-                <a:ea typeface="DFKai-SB" panose="03000509000000000000" pitchFamily="65" charset="-120"/>
-              </a:rPr>
-              <a:t>" (Jos24:15 CUVS) </a:t>
-            </a:r>
-            <a:endParaRPr lang="en-US" altLang="ja-JP" sz="2800" b="1" dirty="0">
-              <a:solidFill>
-                <a:srgbClr val="00B0F0"/>
-              </a:solidFill>
-              <a:latin typeface="DFKai-SB" panose="03000509000000000000" pitchFamily="65" charset="-120"/>
-              <a:ea typeface="DFKai-SB" panose="03000509000000000000" pitchFamily="65" charset="-120"/>
-            </a:endParaRPr>
-          </a:p>
-          <a:p>
-            <a:pPr marL="357505" indent="-357505">
-              <a:buNone/>
-            </a:pPr>
-            <a:r>
-              <a:rPr lang="en-US" altLang="zh-CN" sz="2800" dirty="0">
-                <a:latin typeface="DFKai-SB" panose="03000509000000000000" pitchFamily="65" charset="-120"/>
-                <a:ea typeface="DFKai-SB" panose="03000509000000000000" pitchFamily="65" charset="-120"/>
-              </a:rPr>
-              <a:t>“as for me and my household, we will serve the Lord ." (Jos24:15 NIV).</a:t>
-            </a:r>
-            <a:endParaRPr lang="zh-CN" altLang="en-US" sz="2800" dirty="0">
-              <a:latin typeface="DFKai-SB" panose="03000509000000000000" pitchFamily="65" charset="-120"/>
-              <a:ea typeface="DFKai-SB" panose="03000509000000000000" pitchFamily="65" charset="-120"/>
-            </a:endParaRPr>
-          </a:p>
-        </p:txBody>
-      </p:sp>
-    </p:spTree>
-  </p:cSld>
-  <p:clrMapOvr>
-    <a:masterClrMapping/>
-  </p:clrMapOvr>
-</p:sld>
-</file>
-
-<file path=ppt/slides/slide9.xml><?xml version="1.0" encoding="utf-8"?>
-<p:sld xmlns:a="http://schemas.openxmlformats.org/drawingml/2006/main" xmlns:r="http://schemas.openxmlformats.org/officeDocument/2006/relationships" xmlns:p="http://schemas.openxmlformats.org/presentationml/2006/main">
-  <p:cSld>
-    <p:spTree>
-      <p:nvGrpSpPr>
-        <p:cNvPr id="1" name=""/>
-        <p:cNvGrpSpPr/>
-        <p:nvPr/>
-      </p:nvGrpSpPr>
-      <p:grpSpPr>
-        <a:xfrm>
-          <a:off x="0" y="0"/>
-          <a:ext cx="0" cy="0"/>
-          <a:chOff x="0" y="0"/>
-          <a:chExt cx="0" cy="0"/>
-        </a:xfrm>
-      </p:grpSpPr>
       <p:graphicFrame>
         <p:nvGraphicFramePr>
           <p:cNvPr id="4" name="Content Placeholder 3"/>
@@ -10353,6 +10153,11 @@
             <p:custDataLst>
               <p:tags r:id="rId1"/>
             </p:custDataLst>
+            <p:extLst>
+              <p:ext uri="{D42A27DB-BD31-4B8C-83A1-F6EECF244321}">
+                <p14:modId xmlns:p14="http://schemas.microsoft.com/office/powerpoint/2010/main" val="3061540013"/>
+              </p:ext>
+            </p:extLst>
           </p:nvPr>
         </p:nvGraphicFramePr>
         <p:xfrm>
@@ -10385,7 +10190,7 @@
                       </a:pPr>
                       <a:r>
                         <a:rPr lang="en-US" altLang="zh-CN" sz="3200" dirty="0"/>
-                        <a:t>Closing Prayer</a:t>
+                        <a:t>Theological Question</a:t>
                       </a:r>
                     </a:p>
                   </a:txBody>
@@ -10407,14 +10212,167 @@
                         <a:buNone/>
                       </a:pPr>
                       <a:r>
-                        <a:rPr lang="en-US" sz="2800" i="1" dirty="0"/>
-                        <a:t>Dear Heavenly Father, </a:t>
+                        <a:rPr lang="en-US" sz="2800" i="0" dirty="0"/>
+                        <a:t>What is the theological meaning of </a:t>
                       </a:r>
                       <a:r>
-                        <a:rPr lang="en-US" sz="2800" dirty="0"/>
-                        <a:t>the Glorious Lord, the Creator, and Sovereign of all things. Thank you for your mercy and grace. Thank you for calling us, the parents. Thank you for giving us, the parents, the educational authority. Our children are your heritage. We are the sinners; we do not deserve it. May Your Holy Spirit call us, guide us. Bless our children and young generation to be able to know you, follow you to be the devotional generation. May your name be glorified, generation by generation, and forever. I pray in the name of Jesus. Amen.  </a:t>
+                        <a:rPr lang="en-US" sz="2800" b="1" i="1" dirty="0"/>
+                        <a:t>going to Pharaoh</a:t>
                       </a:r>
-                      <a:endParaRPr lang="en-US" sz="2800" i="1" dirty="0"/>
+                      <a:r>
+                        <a:rPr lang="en-US" sz="2800" i="0" dirty="0"/>
+                        <a:t>?</a:t>
+                      </a:r>
+                    </a:p>
+                    <a:p>
+                      <a:pPr algn="l">
+                        <a:buNone/>
+                      </a:pPr>
+                      <a:r>
+                        <a:rPr lang="ja-JP" altLang="en-US" sz="2800" i="0"/>
+                        <a:t>去见法老的神学意义是什么？</a:t>
+                      </a:r>
+                      <a:endParaRPr lang="en-US" sz="2800" i="0" dirty="0"/>
+                    </a:p>
+                    <a:p>
+                      <a:pPr algn="l">
+                        <a:buNone/>
+                      </a:pPr>
+                      <a:endParaRPr lang="en-US" sz="2800" i="0" dirty="0"/>
+                    </a:p>
+                    <a:p>
+                      <a:pPr algn="l">
+                        <a:buNone/>
+                      </a:pPr>
+                      <a:endParaRPr lang="en-US" sz="2800" i="0" dirty="0"/>
+                    </a:p>
+                    <a:p>
+                      <a:pPr marL="0" marR="0" lvl="0" indent="0" algn="l" defTabSz="914400" rtl="0" eaLnBrk="1" fontAlgn="auto" latinLnBrk="0" hangingPunct="1">
+                        <a:lnSpc>
+                          <a:spcPct val="100000"/>
+                        </a:lnSpc>
+                        <a:spcBef>
+                          <a:spcPts val="0"/>
+                        </a:spcBef>
+                        <a:spcAft>
+                          <a:spcPts val="0"/>
+                        </a:spcAft>
+                        <a:buClrTx/>
+                        <a:buSzTx/>
+                        <a:buFontTx/>
+                        <a:buNone/>
+                        <a:tabLst/>
+                        <a:defRPr/>
+                      </a:pPr>
+                      <a:r>
+                        <a:rPr lang="en-US" sz="2800" i="0" dirty="0"/>
+                        <a:t>What is the theological meaning of </a:t>
+                      </a:r>
+                      <a:r>
+                        <a:rPr lang="en-US" sz="2800" b="1" i="1" dirty="0"/>
+                        <a:t>bringing the Israelites out of Egypt</a:t>
+                      </a:r>
+                      <a:r>
+                        <a:rPr lang="en-US" sz="2800" i="0" dirty="0"/>
+                        <a:t>?</a:t>
+                      </a:r>
+                    </a:p>
+                    <a:p>
+                      <a:pPr marL="0" marR="0" lvl="0" indent="0" algn="l" defTabSz="914400" rtl="0" eaLnBrk="1" fontAlgn="auto" latinLnBrk="0" hangingPunct="1">
+                        <a:lnSpc>
+                          <a:spcPct val="100000"/>
+                        </a:lnSpc>
+                        <a:spcBef>
+                          <a:spcPts val="0"/>
+                        </a:spcBef>
+                        <a:spcAft>
+                          <a:spcPts val="0"/>
+                        </a:spcAft>
+                        <a:buClrTx/>
+                        <a:buSzTx/>
+                        <a:buFontTx/>
+                        <a:buNone/>
+                        <a:tabLst/>
+                        <a:defRPr/>
+                      </a:pPr>
+                      <a:r>
+                        <a:rPr lang="ja-JP" altLang="en-US" sz="2800" i="0"/>
+                        <a:t>带领以色列人出埃及的神学意义是什么？</a:t>
+                      </a:r>
+                      <a:endParaRPr lang="en-US" sz="2800" i="0" dirty="0"/>
+                    </a:p>
+                    <a:p>
+                      <a:pPr marL="0" marR="0" lvl="0" indent="0" algn="l" defTabSz="914400" rtl="0" eaLnBrk="1" fontAlgn="auto" latinLnBrk="0" hangingPunct="1">
+                        <a:lnSpc>
+                          <a:spcPct val="100000"/>
+                        </a:lnSpc>
+                        <a:spcBef>
+                          <a:spcPts val="0"/>
+                        </a:spcBef>
+                        <a:spcAft>
+                          <a:spcPts val="0"/>
+                        </a:spcAft>
+                        <a:buClrTx/>
+                        <a:buSzTx/>
+                        <a:buFontTx/>
+                        <a:buNone/>
+                        <a:tabLst/>
+                        <a:defRPr/>
+                      </a:pPr>
+                      <a:endParaRPr lang="en-US" sz="2800" i="0" dirty="0"/>
+                    </a:p>
+                    <a:p>
+                      <a:pPr marL="0" marR="0" lvl="0" indent="0" algn="l" defTabSz="914400" rtl="0" eaLnBrk="1" fontAlgn="auto" latinLnBrk="0" hangingPunct="1">
+                        <a:lnSpc>
+                          <a:spcPct val="100000"/>
+                        </a:lnSpc>
+                        <a:spcBef>
+                          <a:spcPts val="0"/>
+                        </a:spcBef>
+                        <a:spcAft>
+                          <a:spcPts val="0"/>
+                        </a:spcAft>
+                        <a:buClrTx/>
+                        <a:buSzTx/>
+                        <a:buFontTx/>
+                        <a:buNone/>
+                        <a:tabLst/>
+                        <a:defRPr/>
+                      </a:pPr>
+                      <a:endParaRPr lang="en-US" sz="2800" i="0" dirty="0"/>
+                    </a:p>
+                    <a:p>
+                      <a:pPr marL="0" marR="0" lvl="0" indent="0" algn="l" defTabSz="914400" rtl="0" eaLnBrk="1" fontAlgn="auto" latinLnBrk="0" hangingPunct="1">
+                        <a:lnSpc>
+                          <a:spcPct val="100000"/>
+                        </a:lnSpc>
+                        <a:spcBef>
+                          <a:spcPts val="0"/>
+                        </a:spcBef>
+                        <a:spcAft>
+                          <a:spcPts val="0"/>
+                        </a:spcAft>
+                        <a:buClrTx/>
+                        <a:buSzTx/>
+                        <a:buFontTx/>
+                        <a:buNone/>
+                        <a:tabLst/>
+                        <a:defRPr/>
+                      </a:pPr>
+                      <a:r>
+                        <a:rPr lang="en-US" sz="2800" i="0" dirty="0"/>
+                        <a:t>How can parents bring their children out of the world today?</a:t>
+                      </a:r>
+                    </a:p>
+                    <a:p>
+                      <a:pPr algn="l">
+                        <a:buNone/>
+                      </a:pPr>
+                      <a:r>
+                        <a:rPr lang="ja-JP" altLang="en-US" sz="2800" i="0"/>
+                        <a:t>父母该如何带领孩子脱离世俗？</a:t>
+                      </a:r>
+                      <a:endParaRPr lang="en-US" sz="2800" i="0" dirty="0"/>
                     </a:p>
                   </a:txBody>
                   <a:tcPr marL="137160" marR="137160" marT="137160" marB="137160"/>
@@ -10432,9 +10390,337 @@
     </p:spTree>
     <p:extLst>
       <p:ext uri="{BB962C8B-B14F-4D97-AF65-F5344CB8AC3E}">
-        <p14:creationId xmlns:p14="http://schemas.microsoft.com/office/powerpoint/2010/main" val="3761109616"/>
+        <p14:creationId xmlns:p14="http://schemas.microsoft.com/office/powerpoint/2010/main" val="3795612396"/>
       </p:ext>
     </p:extLst>
+  </p:cSld>
+  <p:clrMapOvr>
+    <a:masterClrMapping/>
+  </p:clrMapOvr>
+</p:sld>
+</file>
+
+<file path=ppt/slides/slide9.xml><?xml version="1.0" encoding="utf-8"?>
+<p:sld xmlns:a="http://schemas.openxmlformats.org/drawingml/2006/main" xmlns:r="http://schemas.openxmlformats.org/officeDocument/2006/relationships" xmlns:p="http://schemas.openxmlformats.org/presentationml/2006/main">
+  <p:cSld>
+    <p:spTree>
+      <p:nvGrpSpPr>
+        <p:cNvPr id="1" name=""/>
+        <p:cNvGrpSpPr/>
+        <p:nvPr/>
+      </p:nvGrpSpPr>
+      <p:grpSpPr>
+        <a:xfrm>
+          <a:off x="0" y="0"/>
+          <a:ext cx="0" cy="0"/>
+          <a:chOff x="0" y="0"/>
+          <a:chExt cx="0" cy="0"/>
+        </a:xfrm>
+      </p:grpSpPr>
+      <p:sp>
+        <p:nvSpPr>
+          <p:cNvPr id="2" name="Title 1"/>
+          <p:cNvSpPr>
+            <a:spLocks noGrp="1"/>
+          </p:cNvSpPr>
+          <p:nvPr>
+            <p:ph type="title"/>
+          </p:nvPr>
+        </p:nvSpPr>
+        <p:spPr>
+          <a:xfrm>
+            <a:off x="609600" y="0"/>
+            <a:ext cx="11081385" cy="686435"/>
+          </a:xfrm>
+        </p:spPr>
+        <p:txBody>
+          <a:bodyPr/>
+          <a:lstStyle/>
+          <a:p>
+            <a:pPr algn="ctr"/>
+            <a:r>
+              <a:rPr lang="zh-CN" altLang="en-US" b="1" dirty="0">
+                <a:solidFill>
+                  <a:srgbClr val="00B050"/>
+                </a:solidFill>
+                <a:latin typeface="DFKai-SB" panose="03000509000000000000" pitchFamily="65" charset="-120"/>
+                <a:ea typeface="DFKai-SB" panose="03000509000000000000" pitchFamily="65" charset="-120"/>
+                <a:sym typeface="+mn-ea"/>
+              </a:rPr>
+              <a:t>個人反思</a:t>
+            </a:r>
+            <a:r>
+              <a:rPr lang="en-US" altLang="zh-CN" b="1" dirty="0">
+                <a:solidFill>
+                  <a:srgbClr val="00B050"/>
+                </a:solidFill>
+                <a:latin typeface="DFKai-SB" panose="03000509000000000000" pitchFamily="65" charset="-120"/>
+                <a:ea typeface="DFKai-SB" panose="03000509000000000000" pitchFamily="65" charset="-120"/>
+                <a:sym typeface="+mn-ea"/>
+              </a:rPr>
+              <a:t> </a:t>
+            </a:r>
+            <a:r>
+              <a:rPr lang="en-US" altLang="zh-CN" b="1" dirty="0">
+                <a:solidFill>
+                  <a:srgbClr val="FF0000"/>
+                </a:solidFill>
+                <a:latin typeface="DFKai-SB" panose="03000509000000000000" pitchFamily="65" charset="-120"/>
+                <a:ea typeface="DFKai-SB" panose="03000509000000000000" pitchFamily="65" charset="-120"/>
+                <a:sym typeface="+mn-ea"/>
+              </a:rPr>
+              <a:t>&amp; </a:t>
+            </a:r>
+            <a:r>
+              <a:rPr lang="zh-CN" altLang="en-US" b="1" dirty="0">
+                <a:solidFill>
+                  <a:srgbClr val="7030A0"/>
+                </a:solidFill>
+                <a:latin typeface="DFKai-SB" panose="03000509000000000000" pitchFamily="65" charset="-120"/>
+                <a:ea typeface="DFKai-SB" panose="03000509000000000000" pitchFamily="65" charset="-120"/>
+              </a:rPr>
+              <a:t>教養智慧</a:t>
+            </a:r>
+            <a:r>
+              <a:rPr lang="en-US" altLang="zh-CN" b="1" dirty="0">
+                <a:solidFill>
+                  <a:srgbClr val="7030A0"/>
+                </a:solidFill>
+                <a:latin typeface="DFKai-SB" panose="03000509000000000000" pitchFamily="65" charset="-120"/>
+                <a:ea typeface="DFKai-SB" panose="03000509000000000000" pitchFamily="65" charset="-120"/>
+              </a:rPr>
+              <a:t> </a:t>
+            </a:r>
+            <a:endParaRPr lang="zh-CN" altLang="en-US" sz="2400" b="1" dirty="0">
+              <a:solidFill>
+                <a:schemeClr val="tx1"/>
+              </a:solidFill>
+              <a:highlight>
+                <a:srgbClr val="FFFF00"/>
+              </a:highlight>
+              <a:latin typeface="DFKai-SB" panose="03000509000000000000" pitchFamily="65" charset="-120"/>
+              <a:ea typeface="DFKai-SB" panose="03000509000000000000" pitchFamily="65" charset="-120"/>
+            </a:endParaRPr>
+          </a:p>
+        </p:txBody>
+      </p:sp>
+      <p:sp>
+        <p:nvSpPr>
+          <p:cNvPr id="3" name="Content Placeholder 2"/>
+          <p:cNvSpPr>
+            <a:spLocks noGrp="1"/>
+          </p:cNvSpPr>
+          <p:nvPr>
+            <p:ph idx="1"/>
+            <p:custDataLst>
+              <p:tags r:id="rId1"/>
+            </p:custDataLst>
+          </p:nvPr>
+        </p:nvSpPr>
+        <p:spPr>
+          <a:xfrm>
+            <a:off x="609600" y="686435"/>
+            <a:ext cx="10972800" cy="5800090"/>
+          </a:xfrm>
+        </p:spPr>
+        <p:txBody>
+          <a:bodyPr/>
+          <a:lstStyle/>
+          <a:p>
+            <a:pPr algn="l">
+              <a:buNone/>
+            </a:pPr>
+            <a:r>
+              <a:rPr lang="en-US" altLang="zh-CN" sz="2600" dirty="0">
+                <a:sym typeface="+mn-ea"/>
+              </a:rPr>
+              <a:t> </a:t>
+            </a:r>
+            <a:r>
+              <a:rPr lang="zh-CN" altLang="en-US" b="1" dirty="0">
+                <a:solidFill>
+                  <a:srgbClr val="00B050"/>
+                </a:solidFill>
+                <a:highlight>
+                  <a:srgbClr val="FFFF00"/>
+                </a:highlight>
+                <a:latin typeface="DFKai-SB" panose="03000509000000000000" pitchFamily="65" charset="-120"/>
+                <a:ea typeface="DFKai-SB" panose="03000509000000000000" pitchFamily="65" charset="-120"/>
+              </a:rPr>
+              <a:t>個人反思</a:t>
+            </a:r>
+            <a:r>
+              <a:rPr lang="zh-CN" altLang="en-US" sz="2800" b="1" dirty="0">
+                <a:solidFill>
+                  <a:srgbClr val="00B050"/>
+                </a:solidFill>
+                <a:latin typeface="DFKai-SB" panose="03000509000000000000" pitchFamily="65" charset="-120"/>
+                <a:ea typeface="DFKai-SB" panose="03000509000000000000" pitchFamily="65" charset="-120"/>
+              </a:rPr>
+              <a:t>：</a:t>
+            </a:r>
+            <a:endParaRPr lang="zh-CN" altLang="en-US" sz="2800" dirty="0">
+              <a:sym typeface="+mn-ea"/>
+            </a:endParaRPr>
+          </a:p>
+          <a:p>
+            <a:pPr marL="357505" indent="-357505" algn="l">
+              <a:buNone/>
+            </a:pPr>
+            <a:r>
+              <a:rPr lang="en-US" altLang="zh-CN" sz="2800" dirty="0">
+                <a:sym typeface="+mn-ea"/>
+              </a:rPr>
+              <a:t>“</a:t>
+            </a:r>
+            <a:r>
+              <a:rPr lang="zh-CN" altLang="en-US" sz="2800" dirty="0">
+                <a:sym typeface="+mn-ea"/>
+              </a:rPr>
+              <a:t>我愿意让孩子相信神，但对我来说无所谓 。</a:t>
+            </a:r>
+            <a:r>
+              <a:rPr lang="en-US" altLang="zh-CN" sz="2800" dirty="0">
+                <a:sym typeface="+mn-ea"/>
+              </a:rPr>
+              <a:t>” </a:t>
+            </a:r>
+            <a:r>
+              <a:rPr lang="ja-JP" altLang="en-US" sz="2800">
+                <a:sym typeface="+mn-ea"/>
+              </a:rPr>
+              <a:t>对吗</a:t>
+            </a:r>
+            <a:r>
+              <a:rPr lang="en-US" altLang="ja-JP" sz="2800" dirty="0">
+                <a:sym typeface="+mn-ea"/>
+              </a:rPr>
+              <a:t>? </a:t>
+            </a:r>
+          </a:p>
+          <a:p>
+            <a:pPr marL="357505" indent="-357505" algn="l">
+              <a:buNone/>
+            </a:pPr>
+            <a:r>
+              <a:rPr lang="en-US" altLang="zh-CN" sz="2800" dirty="0">
+                <a:sym typeface="+mn-ea"/>
+              </a:rPr>
+              <a:t>“I hope my children to believe in God. But it doesn’t matter to me.” Is that right?</a:t>
+            </a:r>
+          </a:p>
+          <a:p>
+            <a:pPr marL="357505" indent="-357505" algn="l">
+              <a:buNone/>
+            </a:pPr>
+            <a:endParaRPr lang="en-US" altLang="zh-CN" sz="2800" b="1" dirty="0">
+              <a:solidFill>
+                <a:srgbClr val="7030A0"/>
+              </a:solidFill>
+              <a:highlight>
+                <a:srgbClr val="FFFF00"/>
+              </a:highlight>
+              <a:latin typeface="DFKai-SB" panose="03000509000000000000" pitchFamily="65" charset="-120"/>
+              <a:ea typeface="DFKai-SB" panose="03000509000000000000" pitchFamily="65" charset="-120"/>
+              <a:sym typeface="+mn-ea"/>
+            </a:endParaRPr>
+          </a:p>
+          <a:p>
+            <a:pPr marL="357505" indent="-357505">
+              <a:buNone/>
+            </a:pPr>
+            <a:r>
+              <a:rPr lang="zh-CN" altLang="en-US" b="1" dirty="0">
+                <a:solidFill>
+                  <a:srgbClr val="7030A0"/>
+                </a:solidFill>
+                <a:highlight>
+                  <a:srgbClr val="FFFF00"/>
+                </a:highlight>
+                <a:latin typeface="DFKai-SB" panose="03000509000000000000" pitchFamily="65" charset="-120"/>
+                <a:ea typeface="DFKai-SB" panose="03000509000000000000" pitchFamily="65" charset="-120"/>
+              </a:rPr>
+              <a:t>教養智慧</a:t>
+            </a:r>
+            <a:r>
+              <a:rPr lang="zh-CN" altLang="en-US" sz="2800" b="1" dirty="0">
+                <a:solidFill>
+                  <a:srgbClr val="00B0F0"/>
+                </a:solidFill>
+                <a:latin typeface="DFKai-SB" panose="03000509000000000000" pitchFamily="65" charset="-120"/>
+                <a:ea typeface="DFKai-SB" panose="03000509000000000000" pitchFamily="65" charset="-120"/>
+              </a:rPr>
+              <a:t>：</a:t>
+            </a:r>
+            <a:endParaRPr lang="en-US" altLang="zh-CN" sz="2800" b="1" dirty="0">
+              <a:solidFill>
+                <a:srgbClr val="00B0F0"/>
+              </a:solidFill>
+              <a:latin typeface="DFKai-SB" panose="03000509000000000000" pitchFamily="65" charset="-120"/>
+              <a:ea typeface="DFKai-SB" panose="03000509000000000000" pitchFamily="65" charset="-120"/>
+            </a:endParaRPr>
+          </a:p>
+          <a:p>
+            <a:pPr marL="357505" indent="-357505">
+              <a:buNone/>
+            </a:pPr>
+            <a:r>
+              <a:rPr lang="en-US" altLang="ja-JP" sz="2800" b="1" dirty="0">
+                <a:solidFill>
+                  <a:srgbClr val="00B0F0"/>
+                </a:solidFill>
+                <a:latin typeface="DFKai-SB" panose="03000509000000000000" pitchFamily="65" charset="-120"/>
+                <a:ea typeface="DFKai-SB" panose="03000509000000000000" pitchFamily="65" charset="-120"/>
+              </a:rPr>
+              <a:t>"</a:t>
+            </a:r>
+            <a:r>
+              <a:rPr lang="ja-JP" altLang="en-US" sz="2800">
+                <a:solidFill>
+                  <a:srgbClr val="00B0F0"/>
+                </a:solidFill>
+                <a:latin typeface="DFKai-SB" panose="03000509000000000000" pitchFamily="65" charset="-120"/>
+                <a:ea typeface="DFKai-SB" panose="03000509000000000000" pitchFamily="65" charset="-120"/>
+              </a:rPr>
+              <a:t>至于我、和我家、我们必定事奉耶和华。</a:t>
+            </a:r>
+            <a:r>
+              <a:rPr lang="en-US" altLang="ja-JP" sz="2800" dirty="0">
+                <a:solidFill>
+                  <a:srgbClr val="00B0F0"/>
+                </a:solidFill>
+                <a:latin typeface="DFKai-SB" panose="03000509000000000000" pitchFamily="65" charset="-120"/>
+                <a:ea typeface="DFKai-SB" panose="03000509000000000000" pitchFamily="65" charset="-120"/>
+              </a:rPr>
+              <a:t>" (Jos24:15 CUVS) </a:t>
+            </a:r>
+            <a:endParaRPr lang="en-US" altLang="ja-JP" sz="2800" b="1" dirty="0">
+              <a:solidFill>
+                <a:srgbClr val="00B0F0"/>
+              </a:solidFill>
+              <a:latin typeface="DFKai-SB" panose="03000509000000000000" pitchFamily="65" charset="-120"/>
+              <a:ea typeface="DFKai-SB" panose="03000509000000000000" pitchFamily="65" charset="-120"/>
+            </a:endParaRPr>
+          </a:p>
+          <a:p>
+            <a:pPr marL="357505" indent="-357505">
+              <a:buNone/>
+            </a:pPr>
+            <a:r>
+              <a:rPr lang="en-US" altLang="zh-CN" sz="2800" dirty="0">
+                <a:latin typeface="DFKai-SB" panose="03000509000000000000" pitchFamily="65" charset="-120"/>
+                <a:ea typeface="DFKai-SB" panose="03000509000000000000" pitchFamily="65" charset="-120"/>
+              </a:rPr>
+              <a:t>“as for me and my household, we will serve the Lord ." (Jos24:15 NIV).</a:t>
+            </a:r>
+            <a:endParaRPr lang="zh-CN" altLang="en-US" sz="2800" dirty="0">
+              <a:latin typeface="DFKai-SB" panose="03000509000000000000" pitchFamily="65" charset="-120"/>
+              <a:ea typeface="DFKai-SB" panose="03000509000000000000" pitchFamily="65" charset="-120"/>
+            </a:endParaRPr>
+          </a:p>
+        </p:txBody>
+      </p:sp>
+    </p:spTree>
   </p:cSld>
   <p:clrMapOvr>
     <a:masterClrMapping/>
@@ -10503,11 +10789,18 @@
 
 <file path=ppt/tags/tag6.xml><?xml version="1.0" encoding="utf-8"?>
 <p:tagLst xmlns:a="http://schemas.openxmlformats.org/drawingml/2006/main" xmlns:r="http://schemas.openxmlformats.org/officeDocument/2006/relationships" xmlns:p="http://schemas.openxmlformats.org/presentationml/2006/main">
+  <p:tag name="TABLE_ENDDRAG_ORIGIN_RECT" val="884*430"/>
+  <p:tag name="TABLE_ENDDRAG_RECT" val="39*87*884*430"/>
+</p:tagLst>
+</file>
+
+<file path=ppt/tags/tag7.xml><?xml version="1.0" encoding="utf-8"?>
+<p:tagLst xmlns:a="http://schemas.openxmlformats.org/drawingml/2006/main" xmlns:r="http://schemas.openxmlformats.org/officeDocument/2006/relationships" xmlns:p="http://schemas.openxmlformats.org/presentationml/2006/main">
   <p:tag name="WPP_GENERATETEXT" val="1"/>
 </p:tagLst>
 </file>
 
-<file path=ppt/tags/tag7.xml><?xml version="1.0" encoding="utf-8"?>
+<file path=ppt/tags/tag8.xml><?xml version="1.0" encoding="utf-8"?>
 <p:tagLst xmlns:a="http://schemas.openxmlformats.org/drawingml/2006/main" xmlns:r="http://schemas.openxmlformats.org/officeDocument/2006/relationships" xmlns:p="http://schemas.openxmlformats.org/presentationml/2006/main">
   <p:tag name="TABLE_ENDDRAG_ORIGIN_RECT" val="884*430"/>
   <p:tag name="TABLE_ENDDRAG_RECT" val="39*87*884*430"/>

</xml_diff>